<commit_message>
update HW_3 Figure colors
</commit_message>
<xml_diff>
--- a/Linear Regression/Abulfeilat_Hisham_HW_3.pptx
+++ b/Linear Regression/Abulfeilat_Hisham_HW_3.pptx
@@ -228,7 +228,7 @@
           <a:p>
             <a:fld id="{866D81A9-CFC2-4640-899E-DD3E177BE50A}" type="datetimeFigureOut">
               <a:rPr lang="en-US" smtClean="0"/>
-              <a:t>10/31/2021</a:t>
+              <a:t>11/2/2021</a:t>
             </a:fld>
             <a:endParaRPr lang="en-US" dirty="0"/>
           </a:p>
@@ -405,7 +405,7 @@
           <a:p>
             <a:fld id="{AA1E50F4-C55A-473A-A70B-4B042EF011A9}" type="datetimeFigureOut">
               <a:rPr lang="en-US" smtClean="0"/>
-              <a:t>10/31/2021</a:t>
+              <a:t>11/2/2021</a:t>
             </a:fld>
             <a:endParaRPr lang="en-US" dirty="0"/>
           </a:p>
@@ -1154,7 +1154,7 @@
             <a:fld id="{87DE6118-2437-4B30-8E3C-4D2BE6020583}" type="datetimeFigureOut">
               <a:rPr lang="en-US" smtClean="0"/>
               <a:pPr/>
-              <a:t>10/31/2021</a:t>
+              <a:t>11/2/2021</a:t>
             </a:fld>
             <a:endParaRPr lang="en-US" dirty="0"/>
           </a:p>
@@ -1490,7 +1490,7 @@
             <a:fld id="{87DE6118-2437-4B30-8E3C-4D2BE6020583}" type="datetimeFigureOut">
               <a:rPr lang="en-US" smtClean="0"/>
               <a:pPr/>
-              <a:t>10/31/2021</a:t>
+              <a:t>11/2/2021</a:t>
             </a:fld>
             <a:endParaRPr lang="en-US" dirty="0"/>
           </a:p>
@@ -1770,7 +1770,7 @@
             <a:fld id="{87DE6118-2437-4B30-8E3C-4D2BE6020583}" type="datetimeFigureOut">
               <a:rPr lang="en-US" smtClean="0"/>
               <a:pPr/>
-              <a:t>10/31/2021</a:t>
+              <a:t>11/2/2021</a:t>
             </a:fld>
             <a:endParaRPr lang="en-US" dirty="0"/>
           </a:p>
@@ -2340,7 +2340,7 @@
             <a:fld id="{87DE6118-2437-4B30-8E3C-4D2BE6020583}" type="datetimeFigureOut">
               <a:rPr lang="en-US" smtClean="0"/>
               <a:pPr/>
-              <a:t>10/31/2021</a:t>
+              <a:t>11/2/2021</a:t>
             </a:fld>
             <a:endParaRPr lang="en-US" dirty="0"/>
           </a:p>
@@ -2620,7 +2620,7 @@
             <a:fld id="{87DE6118-2437-4B30-8E3C-4D2BE6020583}" type="datetimeFigureOut">
               <a:rPr lang="en-US" smtClean="0"/>
               <a:pPr/>
-              <a:t>10/31/2021</a:t>
+              <a:t>11/2/2021</a:t>
             </a:fld>
             <a:endParaRPr lang="en-US" dirty="0"/>
           </a:p>
@@ -3184,7 +3184,7 @@
             <a:fld id="{87DE6118-2437-4B30-8E3C-4D2BE6020583}" type="datetimeFigureOut">
               <a:rPr lang="en-US" smtClean="0"/>
               <a:pPr/>
-              <a:t>10/31/2021</a:t>
+              <a:t>11/2/2021</a:t>
             </a:fld>
             <a:endParaRPr lang="en-US" dirty="0"/>
           </a:p>
@@ -3513,7 +3513,7 @@
             <a:fld id="{87DE6118-2437-4B30-8E3C-4D2BE6020583}" type="datetimeFigureOut">
               <a:rPr lang="en-US" smtClean="0"/>
               <a:pPr/>
-              <a:t>10/31/2021</a:t>
+              <a:t>11/2/2021</a:t>
             </a:fld>
             <a:endParaRPr lang="en-US" dirty="0"/>
           </a:p>
@@ -3719,7 +3719,7 @@
           <a:p>
             <a:fld id="{87DE6118-2437-4B30-8E3C-4D2BE6020583}" type="datetimeFigureOut">
               <a:rPr lang="en-US" smtClean="0"/>
-              <a:t>10/31/2021</a:t>
+              <a:t>11/2/2021</a:t>
             </a:fld>
             <a:endParaRPr lang="en-US" dirty="0"/>
           </a:p>
@@ -3929,7 +3929,7 @@
           <a:p>
             <a:fld id="{87DE6118-2437-4B30-8E3C-4D2BE6020583}" type="datetimeFigureOut">
               <a:rPr lang="en-US" smtClean="0"/>
-              <a:t>10/31/2021</a:t>
+              <a:t>11/2/2021</a:t>
             </a:fld>
             <a:endParaRPr lang="en-US" dirty="0"/>
           </a:p>
@@ -4129,7 +4129,7 @@
           <a:p>
             <a:fld id="{87DE6118-2437-4B30-8E3C-4D2BE6020583}" type="datetimeFigureOut">
               <a:rPr lang="en-US" smtClean="0"/>
-              <a:t>10/31/2021</a:t>
+              <a:t>11/2/2021</a:t>
             </a:fld>
             <a:endParaRPr lang="en-US" dirty="0"/>
           </a:p>
@@ -4406,7 +4406,7 @@
             <a:fld id="{87DE6118-2437-4B30-8E3C-4D2BE6020583}" type="datetimeFigureOut">
               <a:rPr lang="en-US" smtClean="0"/>
               <a:pPr/>
-              <a:t>10/31/2021</a:t>
+              <a:t>11/2/2021</a:t>
             </a:fld>
             <a:endParaRPr lang="en-US" dirty="0"/>
           </a:p>
@@ -4673,7 +4673,7 @@
           <a:p>
             <a:fld id="{87DE6118-2437-4B30-8E3C-4D2BE6020583}" type="datetimeFigureOut">
               <a:rPr lang="en-US" smtClean="0"/>
-              <a:t>10/31/2021</a:t>
+              <a:t>11/2/2021</a:t>
             </a:fld>
             <a:endParaRPr lang="en-US" dirty="0"/>
           </a:p>
@@ -5047,7 +5047,7 @@
           <a:p>
             <a:fld id="{87DE6118-2437-4B30-8E3C-4D2BE6020583}" type="datetimeFigureOut">
               <a:rPr lang="en-US" smtClean="0"/>
-              <a:t>10/31/2021</a:t>
+              <a:t>11/2/2021</a:t>
             </a:fld>
             <a:endParaRPr lang="en-US" dirty="0"/>
           </a:p>
@@ -5195,7 +5195,7 @@
           <a:p>
             <a:fld id="{87DE6118-2437-4B30-8E3C-4D2BE6020583}" type="datetimeFigureOut">
               <a:rPr lang="en-US" smtClean="0"/>
-              <a:t>10/31/2021</a:t>
+              <a:t>11/2/2021</a:t>
             </a:fld>
             <a:endParaRPr lang="en-US" dirty="0"/>
           </a:p>
@@ -5320,7 +5320,7 @@
           <a:p>
             <a:fld id="{87DE6118-2437-4B30-8E3C-4D2BE6020583}" type="datetimeFigureOut">
               <a:rPr lang="en-US" smtClean="0"/>
-              <a:t>10/31/2021</a:t>
+              <a:t>11/2/2021</a:t>
             </a:fld>
             <a:endParaRPr lang="en-US" dirty="0"/>
           </a:p>
@@ -5606,7 +5606,7 @@
             <a:fld id="{87DE6118-2437-4B30-8E3C-4D2BE6020583}" type="datetimeFigureOut">
               <a:rPr lang="en-US" smtClean="0"/>
               <a:pPr/>
-              <a:t>10/31/2021</a:t>
+              <a:t>11/2/2021</a:t>
             </a:fld>
             <a:endParaRPr lang="en-US" dirty="0"/>
           </a:p>
@@ -5932,7 +5932,7 @@
             <a:fld id="{87DE6118-2437-4B30-8E3C-4D2BE6020583}" type="datetimeFigureOut">
               <a:rPr lang="en-US" smtClean="0"/>
               <a:pPr/>
-              <a:t>10/31/2021</a:t>
+              <a:t>11/2/2021</a:t>
             </a:fld>
             <a:endParaRPr lang="en-US" dirty="0"/>
           </a:p>
@@ -6148,7 +6148,7 @@
             <a:fld id="{87DE6118-2437-4B30-8E3C-4D2BE6020583}" type="datetimeFigureOut">
               <a:rPr lang="en-US" smtClean="0"/>
               <a:pPr/>
-              <a:t>10/31/2021</a:t>
+              <a:t>11/2/2021</a:t>
             </a:fld>
             <a:endParaRPr lang="en-US" dirty="0"/>
           </a:p>
@@ -6978,6 +6978,52 @@
           <a:prstGeom prst="rect">
             <a:avLst/>
           </a:prstGeom>
+          <a:gradFill>
+            <a:gsLst>
+              <a:gs pos="44255">
+                <a:srgbClr val="F9C9D6"/>
+              </a:gs>
+              <a:gs pos="53102">
+                <a:srgbClr val="F8C0D0"/>
+              </a:gs>
+              <a:gs pos="19469">
+                <a:schemeClr val="tx1">
+                  <a:lumMod val="98000"/>
+                </a:schemeClr>
+              </a:gs>
+              <a:gs pos="7074">
+                <a:srgbClr val="FDEFF3"/>
+              </a:gs>
+              <a:gs pos="35372">
+                <a:srgbClr val="FAD2DD"/>
+              </a:gs>
+              <a:gs pos="0">
+                <a:schemeClr val="accent1">
+                  <a:lumMod val="5000"/>
+                  <a:lumOff val="95000"/>
+                </a:schemeClr>
+              </a:gs>
+              <a:gs pos="74000">
+                <a:schemeClr val="accent1">
+                  <a:lumMod val="45000"/>
+                  <a:lumOff val="55000"/>
+                </a:schemeClr>
+              </a:gs>
+              <a:gs pos="83000">
+                <a:schemeClr val="accent1">
+                  <a:lumMod val="45000"/>
+                  <a:lumOff val="55000"/>
+                </a:schemeClr>
+              </a:gs>
+              <a:gs pos="100000">
+                <a:schemeClr val="accent1">
+                  <a:lumMod val="30000"/>
+                  <a:lumOff val="70000"/>
+                </a:schemeClr>
+              </a:gs>
+            </a:gsLst>
+            <a:lin ang="5400000" scaled="1"/>
+          </a:gradFill>
         </p:spPr>
       </p:pic>
     </p:spTree>
@@ -7959,24 +8005,6 @@
 </file>
 
 <file path=customXml/item1.xml><?xml version="1.0" encoding="utf-8"?>
-<p:properties xmlns:p="http://schemas.microsoft.com/office/2006/metadata/properties" xmlns:xsi="http://www.w3.org/2001/XMLSchema-instance" xmlns:pc="http://schemas.microsoft.com/office/infopath/2007/PartnerControls">
-  <documentManagement>
-    <Status xmlns="71af3243-3dd4-4a8d-8c0d-dd76da1f02a5">Not started</Status>
-    <MediaServiceKeyPoints xmlns="71af3243-3dd4-4a8d-8c0d-dd76da1f02a5" xsi:nil="true"/>
-  </documentManagement>
-</p:properties>
-</file>
-
-<file path=customXml/item2.xml><?xml version="1.0" encoding="utf-8"?>
-<?mso-contentType ?>
-<FormTemplates xmlns="http://schemas.microsoft.com/sharepoint/v3/contenttype/forms">
-  <Display>DocumentLibraryForm</Display>
-  <Edit>DocumentLibraryForm</Edit>
-  <New>DocumentLibraryForm</New>
-</FormTemplates>
-</file>
-
-<file path=customXml/item3.xml><?xml version="1.0" encoding="utf-8"?>
 <ct:contentTypeSchema xmlns:ct="http://schemas.microsoft.com/office/2006/metadata/contentType" xmlns:ma="http://schemas.microsoft.com/office/2006/metadata/properties/metaAttributes" ct:_="" ma:_="" ma:contentTypeName="Document" ma:contentTypeID="0x01010079F111ED35F8CC479449609E8A0923A6" ma:contentTypeVersion="12" ma:contentTypeDescription="Create a new document." ma:contentTypeScope="" ma:versionID="93813dd7ca6ad654711aa0ab317e03a3">
   <xsd:schema xmlns:xsd="http://www.w3.org/2001/XMLSchema" xmlns:xs="http://www.w3.org/2001/XMLSchema" xmlns:p="http://schemas.microsoft.com/office/2006/metadata/properties" xmlns:ns2="71af3243-3dd4-4a8d-8c0d-dd76da1f02a5" xmlns:ns3="16c05727-aa75-4e4a-9b5f-8a80a1165891" targetNamespace="http://schemas.microsoft.com/office/2006/metadata/properties" ma:root="true" ma:fieldsID="f11dc0ce689dd3925e84e4e35398c6e7" ns2:_="" ns3:_="">
     <xsd:import namespace="71af3243-3dd4-4a8d-8c0d-dd76da1f02a5"/>
@@ -8197,25 +8225,25 @@
 </ct:contentTypeSchema>
 </file>
 
-<file path=customXml/itemProps1.xml><?xml version="1.0" encoding="utf-8"?>
-<ds:datastoreItem xmlns:ds="http://schemas.openxmlformats.org/officeDocument/2006/customXml" ds:itemID="{1F08B90B-70ED-4539-9C14-FB2728D9064F}">
-  <ds:schemaRefs>
-    <ds:schemaRef ds:uri="http://schemas.microsoft.com/office/2006/metadata/properties"/>
-    <ds:schemaRef ds:uri="http://schemas.microsoft.com/office/infopath/2007/PartnerControls"/>
-    <ds:schemaRef ds:uri="71af3243-3dd4-4a8d-8c0d-dd76da1f02a5"/>
-  </ds:schemaRefs>
-</ds:datastoreItem>
+<file path=customXml/item2.xml><?xml version="1.0" encoding="utf-8"?>
+<?mso-contentType ?>
+<FormTemplates xmlns="http://schemas.microsoft.com/sharepoint/v3/contenttype/forms">
+  <Display>DocumentLibraryForm</Display>
+  <Edit>DocumentLibraryForm</Edit>
+  <New>DocumentLibraryForm</New>
+</FormTemplates>
 </file>
 
-<file path=customXml/itemProps2.xml><?xml version="1.0" encoding="utf-8"?>
-<ds:datastoreItem xmlns:ds="http://schemas.openxmlformats.org/officeDocument/2006/customXml" ds:itemID="{A0D51BCB-0419-432E-B7F1-25548446A625}">
-  <ds:schemaRefs>
-    <ds:schemaRef ds:uri="http://schemas.microsoft.com/sharepoint/v3/contenttype/forms"/>
-  </ds:schemaRefs>
-</ds:datastoreItem>
+<file path=customXml/item3.xml><?xml version="1.0" encoding="utf-8"?>
+<p:properties xmlns:p="http://schemas.microsoft.com/office/2006/metadata/properties" xmlns:xsi="http://www.w3.org/2001/XMLSchema-instance" xmlns:pc="http://schemas.microsoft.com/office/infopath/2007/PartnerControls">
+  <documentManagement>
+    <Status xmlns="71af3243-3dd4-4a8d-8c0d-dd76da1f02a5">Not started</Status>
+    <MediaServiceKeyPoints xmlns="71af3243-3dd4-4a8d-8c0d-dd76da1f02a5" xsi:nil="true"/>
+  </documentManagement>
+</p:properties>
 </file>
 
-<file path=customXml/itemProps3.xml><?xml version="1.0" encoding="utf-8"?>
+<file path=customXml/itemProps1.xml><?xml version="1.0" encoding="utf-8"?>
 <ds:datastoreItem xmlns:ds="http://schemas.openxmlformats.org/officeDocument/2006/customXml" ds:itemID="{9E8D3305-1D9D-4BC8-A40F-6F8AE50BD76B}">
   <ds:schemaRefs>
     <ds:schemaRef ds:uri="http://schemas.microsoft.com/office/2006/metadata/contentType"/>
@@ -8232,4 +8260,22 @@
     <ds:schemaRef ds:uri="http://schemas.microsoft.com/internal/obd"/>
   </ds:schemaRefs>
 </ds:datastoreItem>
+</file>
+
+<file path=customXml/itemProps2.xml><?xml version="1.0" encoding="utf-8"?>
+<ds:datastoreItem xmlns:ds="http://schemas.openxmlformats.org/officeDocument/2006/customXml" ds:itemID="{A0D51BCB-0419-432E-B7F1-25548446A625}">
+  <ds:schemaRefs>
+    <ds:schemaRef ds:uri="http://schemas.microsoft.com/sharepoint/v3/contenttype/forms"/>
+  </ds:schemaRefs>
+</ds:datastoreItem>
+</file>
+
+<file path=customXml/itemProps3.xml><?xml version="1.0" encoding="utf-8"?>
+<ds:datastoreItem xmlns:ds="http://schemas.openxmlformats.org/officeDocument/2006/customXml" ds:itemID="{1F08B90B-70ED-4539-9C14-FB2728D9064F}">
+  <ds:schemaRefs>
+    <ds:schemaRef ds:uri="http://schemas.microsoft.com/office/2006/metadata/properties"/>
+    <ds:schemaRef ds:uri="http://schemas.microsoft.com/office/infopath/2007/PartnerControls"/>
+    <ds:schemaRef ds:uri="71af3243-3dd4-4a8d-8c0d-dd76da1f02a5"/>
+  </ds:schemaRefs>
+</ds:datastoreItem>
 </file>
</xml_diff>